<commit_message>
Presentation file of first iteration
</commit_message>
<xml_diff>
--- a/Presentation (Iteration 1) .pptx
+++ b/Presentation (Iteration 1) .pptx
@@ -108,6 +108,11 @@
       </a:defRPr>
     </a:lvl9pPr>
   </p:defaultTextStyle>
+  <p:extLst>
+    <p:ext uri="{EFAFB233-063F-42B5-8137-9DF3F51BA10A}">
+      <p15:sldGuideLst xmlns:p15="http://schemas.microsoft.com/office/powerpoint/2012/main"/>
+    </p:ext>
+  </p:extLst>
 </p:presentation>
 </file>
 
@@ -7894,8 +7899,8 @@
           </a:p>
           <a:p>
             <a:r>
-              <a:rPr lang="en-AU" dirty="0" smtClean="0"/>
-              <a:t>1.3. Performing </a:t>
+              <a:rPr lang="en-AU" smtClean="0"/>
+              <a:t>Performing </a:t>
             </a:r>
             <a:r>
               <a:rPr lang="en-AU" dirty="0" smtClean="0">
@@ -7908,8 +7913,12 @@
           </a:p>
           <a:p>
             <a:r>
+              <a:rPr lang="en-AU" smtClean="0"/>
+              <a:t>Determination </a:t>
+            </a:r>
+            <a:r>
               <a:rPr lang="en-AU" dirty="0" smtClean="0"/>
-              <a:t>1.4. Determination of </a:t>
+              <a:t>of </a:t>
             </a:r>
             <a:r>
               <a:rPr lang="en-AU" dirty="0" smtClean="0">

</xml_diff>